<commit_message>
pres + inleiding update
</commit_message>
<xml_diff>
--- a/Documents/OOP project presentatie.pptx
+++ b/Documents/OOP project presentatie.pptx
@@ -5,10 +5,10 @@
     <p:sldMasterId id="2147483649" r:id="rId1"/>
   </p:sldMasterIdLst>
   <p:notesMasterIdLst>
-    <p:notesMasterId r:id="rId13"/>
+    <p:notesMasterId r:id="rId14"/>
   </p:notesMasterIdLst>
   <p:handoutMasterIdLst>
-    <p:handoutMasterId r:id="rId14"/>
+    <p:handoutMasterId r:id="rId15"/>
   </p:handoutMasterIdLst>
   <p:sldIdLst>
     <p:sldId id="377" r:id="rId2"/>
@@ -20,8 +20,9 @@
     <p:sldId id="385" r:id="rId8"/>
     <p:sldId id="391" r:id="rId9"/>
     <p:sldId id="401" r:id="rId10"/>
-    <p:sldId id="404" r:id="rId11"/>
-    <p:sldId id="394" r:id="rId12"/>
+    <p:sldId id="405" r:id="rId11"/>
+    <p:sldId id="404" r:id="rId12"/>
+    <p:sldId id="394" r:id="rId13"/>
   </p:sldIdLst>
   <p:sldSz cx="9144000" cy="6858000" type="screen4x3"/>
   <p:notesSz cx="6794500" cy="9931400"/>
@@ -4857,11 +4858,7 @@
             <a:pPr algn="l"/>
             <a:r>
               <a:rPr lang="nl-NL" sz="1800" dirty="0" smtClean="0"/>
-              <a:t>Roy </a:t>
-            </a:r>
-            <a:r>
-              <a:rPr lang="nl-NL" sz="1800" dirty="0" smtClean="0"/>
-              <a:t>Klip</a:t>
+              <a:t>Roy Klip</a:t>
             </a:r>
           </a:p>
           <a:p>
@@ -5019,6 +5016,142 @@
               <a:rPr lang="nl-NL" dirty="0" smtClean="0">
                 <a:latin typeface="+mn-lt"/>
               </a:rPr>
+              <a:t>Code </a:t>
+            </a:r>
+            <a:r>
+              <a:rPr lang="nl-NL" dirty="0" err="1" smtClean="0">
+                <a:latin typeface="+mn-lt"/>
+              </a:rPr>
+              <a:t>Coverage</a:t>
+            </a:r>
+            <a:endParaRPr lang="nl-NL" dirty="0">
+              <a:latin typeface="+mn-lt"/>
+            </a:endParaRPr>
+          </a:p>
+        </p:txBody>
+      </p:sp>
+      <p:sp>
+        <p:nvSpPr>
+          <p:cNvPr id="3" name="Tijdelijke aanduiding voor inhoud 2"/>
+          <p:cNvSpPr>
+            <a:spLocks noGrp="1"/>
+          </p:cNvSpPr>
+          <p:nvPr>
+            <p:ph idx="1"/>
+          </p:nvPr>
+        </p:nvSpPr>
+        <p:spPr/>
+        <p:txBody>
+          <a:bodyPr/>
+          <a:lstStyle/>
+          <a:p>
+            <a:r>
+              <a:rPr lang="nl-NL" dirty="0" smtClean="0"/>
+              <a:t>80% is bereikt</a:t>
+            </a:r>
+          </a:p>
+          <a:p>
+            <a:endParaRPr lang="nl-NL" dirty="0"/>
+          </a:p>
+          <a:p>
+            <a:r>
+              <a:rPr lang="nl-NL" dirty="0" smtClean="0"/>
+              <a:t>Geen controller en view</a:t>
+            </a:r>
+            <a:endParaRPr lang="nl-NL" dirty="0"/>
+          </a:p>
+        </p:txBody>
+      </p:sp>
+      <p:pic>
+        <p:nvPicPr>
+          <p:cNvPr id="1026" name="Picture 2" descr="https://lh4.googleusercontent.com/hsCukDoSUOKbifjksPl_Anil4hJPitwvKo-Yt3BpQ-cCoUpzYkvSEi69fj0PKZi6usM5U-oUa8sgN8KY9xnK2P96jtZsiADy2hNc4AHoGnLOKFBfBcnUxpZDWg"/>
+          <p:cNvPicPr>
+            <a:picLocks noChangeAspect="1" noChangeArrowheads="1"/>
+          </p:cNvPicPr>
+          <p:nvPr/>
+        </p:nvPicPr>
+        <p:blipFill>
+          <a:blip r:embed="rId2">
+            <a:extLst>
+              <a:ext uri="{28A0092B-C50C-407E-A947-70E740481C1C}">
+                <a14:useLocalDpi xmlns:a14="http://schemas.microsoft.com/office/drawing/2010/main" val="0"/>
+              </a:ext>
+            </a:extLst>
+          </a:blip>
+          <a:srcRect/>
+          <a:stretch>
+            <a:fillRect/>
+          </a:stretch>
+        </p:blipFill>
+        <p:spPr bwMode="auto">
+          <a:xfrm>
+            <a:off x="4263552" y="491319"/>
+            <a:ext cx="4291978" cy="5697618"/>
+          </a:xfrm>
+          <a:prstGeom prst="rect">
+            <a:avLst/>
+          </a:prstGeom>
+          <a:noFill/>
+          <a:extLst>
+            <a:ext uri="{909E8E84-426E-40DD-AFC4-6F175D3DCCD1}">
+              <a14:hiddenFill xmlns:a14="http://schemas.microsoft.com/office/drawing/2010/main">
+                <a:solidFill>
+                  <a:srgbClr val="FFFFFF"/>
+                </a:solidFill>
+              </a14:hiddenFill>
+            </a:ext>
+          </a:extLst>
+        </p:spPr>
+      </p:pic>
+    </p:spTree>
+    <p:extLst>
+      <p:ext uri="{BB962C8B-B14F-4D97-AF65-F5344CB8AC3E}">
+        <p14:creationId xmlns:p14="http://schemas.microsoft.com/office/powerpoint/2010/main" val="1507290860"/>
+      </p:ext>
+    </p:extLst>
+  </p:cSld>
+  <p:clrMapOvr>
+    <a:masterClrMapping/>
+  </p:clrMapOvr>
+</p:sld>
+</file>
+
+<file path=ppt/slides/slide11.xml><?xml version="1.0" encoding="utf-8"?>
+<p:sld xmlns:a="http://schemas.openxmlformats.org/drawingml/2006/main" xmlns:r="http://schemas.openxmlformats.org/officeDocument/2006/relationships" xmlns:p="http://schemas.openxmlformats.org/presentationml/2006/main">
+  <p:cSld>
+    <p:spTree>
+      <p:nvGrpSpPr>
+        <p:cNvPr id="1" name=""/>
+        <p:cNvGrpSpPr/>
+        <p:nvPr/>
+      </p:nvGrpSpPr>
+      <p:grpSpPr>
+        <a:xfrm>
+          <a:off x="0" y="0"/>
+          <a:ext cx="0" cy="0"/>
+          <a:chOff x="0" y="0"/>
+          <a:chExt cx="0" cy="0"/>
+        </a:xfrm>
+      </p:grpSpPr>
+      <p:sp>
+        <p:nvSpPr>
+          <p:cNvPr id="2" name="Titel 1"/>
+          <p:cNvSpPr>
+            <a:spLocks noGrp="1"/>
+          </p:cNvSpPr>
+          <p:nvPr>
+            <p:ph type="title"/>
+          </p:nvPr>
+        </p:nvSpPr>
+        <p:spPr/>
+        <p:txBody>
+          <a:bodyPr/>
+          <a:lstStyle/>
+          <a:p>
+            <a:r>
+              <a:rPr lang="nl-NL" dirty="0" smtClean="0">
+                <a:latin typeface="+mn-lt"/>
+              </a:rPr>
               <a:t>Eisen van het programma</a:t>
             </a:r>
             <a:endParaRPr lang="nl-NL" dirty="0">
@@ -5106,7 +5239,7 @@
 </p:sld>
 </file>
 
-<file path=ppt/slides/slide11.xml><?xml version="1.0" encoding="utf-8"?>
+<file path=ppt/slides/slide12.xml><?xml version="1.0" encoding="utf-8"?>
 <p:sld xmlns:a="http://schemas.openxmlformats.org/drawingml/2006/main" xmlns:r="http://schemas.openxmlformats.org/officeDocument/2006/relationships" xmlns:p="http://schemas.openxmlformats.org/presentationml/2006/main">
   <p:cSld>
     <p:spTree>
@@ -5300,11 +5433,7 @@
             <a:pPr algn="l"/>
             <a:r>
               <a:rPr lang="nl-NL" sz="1800" dirty="0" smtClean="0"/>
-              <a:t>Roy </a:t>
-            </a:r>
-            <a:r>
-              <a:rPr lang="nl-NL" sz="1800" dirty="0" smtClean="0"/>
-              <a:t>Klip</a:t>
+              <a:t>Roy Klip</a:t>
             </a:r>
           </a:p>
           <a:p>
@@ -5530,8 +5659,30 @@
           <a:p>
             <a:r>
               <a:rPr lang="nl-NL" dirty="0" smtClean="0"/>
-              <a:t>Grafische User Interface</a:t>
-            </a:r>
+              <a:t>Grafische User </a:t>
+            </a:r>
+            <a:r>
+              <a:rPr lang="nl-NL" dirty="0" smtClean="0"/>
+              <a:t>Interface</a:t>
+            </a:r>
+          </a:p>
+          <a:p>
+            <a:endParaRPr lang="nl-NL" dirty="0"/>
+          </a:p>
+          <a:p>
+            <a:r>
+              <a:rPr lang="nl-NL" dirty="0" smtClean="0"/>
+              <a:t>Code </a:t>
+            </a:r>
+            <a:r>
+              <a:rPr lang="nl-NL" dirty="0" err="1" smtClean="0"/>
+              <a:t>Coverage</a:t>
+            </a:r>
+            <a:r>
+              <a:rPr lang="nl-NL" dirty="0" smtClean="0"/>
+              <a:t> van minstens 80%</a:t>
+            </a:r>
+            <a:endParaRPr lang="nl-NL" dirty="0" smtClean="0"/>
           </a:p>
         </p:txBody>
       </p:sp>
@@ -5723,13 +5874,7 @@
               <a:rPr lang="nl-NL" dirty="0" smtClean="0">
                 <a:latin typeface="+mn-lt"/>
               </a:rPr>
-              <a:t>Cijfers</a:t>
-            </a:r>
-            <a:r>
-              <a:rPr lang="nl-NL" dirty="0" smtClean="0">
-                <a:latin typeface="+mn-lt"/>
-              </a:rPr>
-              <a:t> </a:t>
+              <a:t>Cijfers </a:t>
             </a:r>
             <a:endParaRPr lang="nl-NL" dirty="0">
               <a:latin typeface="+mn-lt"/>
@@ -5998,6 +6143,13 @@
   <p:clrMapOvr>
     <a:masterClrMapping/>
   </p:clrMapOvr>
+  <p:timing>
+    <p:tnLst>
+      <p:par>
+        <p:cTn id="1" dur="indefinite" restart="never" nodeType="tmRoot"/>
+      </p:par>
+    </p:tnLst>
+  </p:timing>
 </p:sld>
 </file>
 
@@ -6512,7 +6664,6 @@
               <a:rPr lang="nl-NL" dirty="0" smtClean="0"/>
               <a:t>Functie in de View</a:t>
             </a:r>
-            <a:endParaRPr lang="nl-NL" dirty="0" smtClean="0"/>
           </a:p>
           <a:p>
             <a:endParaRPr lang="nl-NL" dirty="0" smtClean="0"/>

</xml_diff>